<commit_message>
fixing a contraction bug due to some segments now not having a glide plane
</commit_message>
<xml_diff>
--- a/doxygen/dox/Figures.pptx
+++ b/doxygen/dox/Figures.pptx
@@ -271,7 +271,7 @@
           <a:p>
             <a:fld id="{D23F2A37-FA4E-404F-8684-2B916B73A0A7}" type="datetimeFigureOut">
               <a:rPr lang="en-US" smtClean="0"/>
-              <a:t>7/1/19</a:t>
+              <a:t>9/10/19</a:t>
             </a:fld>
             <a:endParaRPr lang="en-US"/>
           </a:p>
@@ -469,7 +469,7 @@
           <a:p>
             <a:fld id="{D23F2A37-FA4E-404F-8684-2B916B73A0A7}" type="datetimeFigureOut">
               <a:rPr lang="en-US" smtClean="0"/>
-              <a:t>7/1/19</a:t>
+              <a:t>9/10/19</a:t>
             </a:fld>
             <a:endParaRPr lang="en-US"/>
           </a:p>
@@ -677,7 +677,7 @@
           <a:p>
             <a:fld id="{D23F2A37-FA4E-404F-8684-2B916B73A0A7}" type="datetimeFigureOut">
               <a:rPr lang="en-US" smtClean="0"/>
-              <a:t>7/1/19</a:t>
+              <a:t>9/10/19</a:t>
             </a:fld>
             <a:endParaRPr lang="en-US"/>
           </a:p>
@@ -875,7 +875,7 @@
           <a:p>
             <a:fld id="{D23F2A37-FA4E-404F-8684-2B916B73A0A7}" type="datetimeFigureOut">
               <a:rPr lang="en-US" smtClean="0"/>
-              <a:t>7/1/19</a:t>
+              <a:t>9/10/19</a:t>
             </a:fld>
             <a:endParaRPr lang="en-US"/>
           </a:p>
@@ -1150,7 +1150,7 @@
           <a:p>
             <a:fld id="{D23F2A37-FA4E-404F-8684-2B916B73A0A7}" type="datetimeFigureOut">
               <a:rPr lang="en-US" smtClean="0"/>
-              <a:t>7/1/19</a:t>
+              <a:t>9/10/19</a:t>
             </a:fld>
             <a:endParaRPr lang="en-US"/>
           </a:p>
@@ -1415,7 +1415,7 @@
           <a:p>
             <a:fld id="{D23F2A37-FA4E-404F-8684-2B916B73A0A7}" type="datetimeFigureOut">
               <a:rPr lang="en-US" smtClean="0"/>
-              <a:t>7/1/19</a:t>
+              <a:t>9/10/19</a:t>
             </a:fld>
             <a:endParaRPr lang="en-US"/>
           </a:p>
@@ -1827,7 +1827,7 @@
           <a:p>
             <a:fld id="{D23F2A37-FA4E-404F-8684-2B916B73A0A7}" type="datetimeFigureOut">
               <a:rPr lang="en-US" smtClean="0"/>
-              <a:t>7/1/19</a:t>
+              <a:t>9/10/19</a:t>
             </a:fld>
             <a:endParaRPr lang="en-US"/>
           </a:p>
@@ -1968,7 +1968,7 @@
           <a:p>
             <a:fld id="{D23F2A37-FA4E-404F-8684-2B916B73A0A7}" type="datetimeFigureOut">
               <a:rPr lang="en-US" smtClean="0"/>
-              <a:t>7/1/19</a:t>
+              <a:t>9/10/19</a:t>
             </a:fld>
             <a:endParaRPr lang="en-US"/>
           </a:p>
@@ -2081,7 +2081,7 @@
           <a:p>
             <a:fld id="{D23F2A37-FA4E-404F-8684-2B916B73A0A7}" type="datetimeFigureOut">
               <a:rPr lang="en-US" smtClean="0"/>
-              <a:t>7/1/19</a:t>
+              <a:t>9/10/19</a:t>
             </a:fld>
             <a:endParaRPr lang="en-US"/>
           </a:p>
@@ -2392,7 +2392,7 @@
           <a:p>
             <a:fld id="{D23F2A37-FA4E-404F-8684-2B916B73A0A7}" type="datetimeFigureOut">
               <a:rPr lang="en-US" smtClean="0"/>
-              <a:t>7/1/19</a:t>
+              <a:t>9/10/19</a:t>
             </a:fld>
             <a:endParaRPr lang="en-US"/>
           </a:p>
@@ -2680,7 +2680,7 @@
           <a:p>
             <a:fld id="{D23F2A37-FA4E-404F-8684-2B916B73A0A7}" type="datetimeFigureOut">
               <a:rPr lang="en-US" smtClean="0"/>
-              <a:t>7/1/19</a:t>
+              <a:t>9/10/19</a:t>
             </a:fld>
             <a:endParaRPr lang="en-US"/>
           </a:p>
@@ -2921,7 +2921,7 @@
           <a:p>
             <a:fld id="{D23F2A37-FA4E-404F-8684-2B916B73A0A7}" type="datetimeFigureOut">
               <a:rPr lang="en-US" smtClean="0"/>
-              <a:t>7/1/19</a:t>
+              <a:t>9/10/19</a:t>
             </a:fld>
             <a:endParaRPr lang="en-US"/>
           </a:p>
@@ -14127,6 +14127,155 @@
       </p:grpSpPr>
       <p:sp>
         <p:nvSpPr>
+          <p:cNvPr id="36" name="Rectangle 35">
+            <a:extLst>
+              <a:ext uri="{FF2B5EF4-FFF2-40B4-BE49-F238E27FC236}">
+                <a16:creationId xmlns:a16="http://schemas.microsoft.com/office/drawing/2014/main" id="{C0CB295E-20B6-7545-BC0B-13817E49652A}"/>
+              </a:ext>
+            </a:extLst>
+          </p:cNvPr>
+          <p:cNvSpPr/>
+          <p:nvPr/>
+        </p:nvSpPr>
+        <p:spPr>
+          <a:xfrm>
+            <a:off x="243086" y="3757626"/>
+            <a:ext cx="11743016" cy="3039370"/>
+          </a:xfrm>
+          <a:prstGeom prst="rect">
+            <a:avLst/>
+          </a:prstGeom>
+          <a:solidFill>
+            <a:schemeClr val="bg2"/>
+          </a:solidFill>
+        </p:spPr>
+        <p:style>
+          <a:lnRef idx="2">
+            <a:schemeClr val="accent1">
+              <a:shade val="50000"/>
+            </a:schemeClr>
+          </a:lnRef>
+          <a:fillRef idx="1">
+            <a:schemeClr val="accent1"/>
+          </a:fillRef>
+          <a:effectRef idx="0">
+            <a:schemeClr val="accent1"/>
+          </a:effectRef>
+          <a:fontRef idx="minor">
+            <a:schemeClr val="lt1"/>
+          </a:fontRef>
+        </p:style>
+        <p:txBody>
+          <a:bodyPr rtlCol="0" anchor="ctr"/>
+          <a:lstStyle/>
+          <a:p>
+            <a:pPr algn="ctr"/>
+            <a:endParaRPr lang="en-US"/>
+          </a:p>
+        </p:txBody>
+      </p:sp>
+      <p:sp>
+        <p:nvSpPr>
+          <p:cNvPr id="35" name="Rectangle 34">
+            <a:extLst>
+              <a:ext uri="{FF2B5EF4-FFF2-40B4-BE49-F238E27FC236}">
+                <a16:creationId xmlns:a16="http://schemas.microsoft.com/office/drawing/2014/main" id="{DD407F2E-A595-644B-A1A6-B3B2A044B871}"/>
+              </a:ext>
+            </a:extLst>
+          </p:cNvPr>
+          <p:cNvSpPr/>
+          <p:nvPr/>
+        </p:nvSpPr>
+        <p:spPr>
+          <a:xfrm>
+            <a:off x="248280" y="1913456"/>
+            <a:ext cx="11743016" cy="1842308"/>
+          </a:xfrm>
+          <a:prstGeom prst="rect">
+            <a:avLst/>
+          </a:prstGeom>
+          <a:solidFill>
+            <a:schemeClr val="bg2">
+              <a:lumMod val="75000"/>
+            </a:schemeClr>
+          </a:solidFill>
+        </p:spPr>
+        <p:style>
+          <a:lnRef idx="2">
+            <a:schemeClr val="accent1">
+              <a:shade val="50000"/>
+            </a:schemeClr>
+          </a:lnRef>
+          <a:fillRef idx="1">
+            <a:schemeClr val="accent1"/>
+          </a:fillRef>
+          <a:effectRef idx="0">
+            <a:schemeClr val="accent1"/>
+          </a:effectRef>
+          <a:fontRef idx="minor">
+            <a:schemeClr val="lt1"/>
+          </a:fontRef>
+        </p:style>
+        <p:txBody>
+          <a:bodyPr rtlCol="0" anchor="ctr"/>
+          <a:lstStyle/>
+          <a:p>
+            <a:pPr algn="ctr"/>
+            <a:endParaRPr lang="en-US"/>
+          </a:p>
+        </p:txBody>
+      </p:sp>
+      <p:sp>
+        <p:nvSpPr>
+          <p:cNvPr id="2" name="Rectangle 1">
+            <a:extLst>
+              <a:ext uri="{FF2B5EF4-FFF2-40B4-BE49-F238E27FC236}">
+                <a16:creationId xmlns:a16="http://schemas.microsoft.com/office/drawing/2014/main" id="{8A9C84E2-6EDF-F941-B7CE-54195C85A149}"/>
+              </a:ext>
+            </a:extLst>
+          </p:cNvPr>
+          <p:cNvSpPr/>
+          <p:nvPr/>
+        </p:nvSpPr>
+        <p:spPr>
+          <a:xfrm>
+            <a:off x="243086" y="61004"/>
+            <a:ext cx="11743016" cy="1842308"/>
+          </a:xfrm>
+          <a:prstGeom prst="rect">
+            <a:avLst/>
+          </a:prstGeom>
+          <a:solidFill>
+            <a:schemeClr val="bg2"/>
+          </a:solidFill>
+        </p:spPr>
+        <p:style>
+          <a:lnRef idx="2">
+            <a:schemeClr val="accent1">
+              <a:shade val="50000"/>
+            </a:schemeClr>
+          </a:lnRef>
+          <a:fillRef idx="1">
+            <a:schemeClr val="accent1"/>
+          </a:fillRef>
+          <a:effectRef idx="0">
+            <a:schemeClr val="accent1"/>
+          </a:effectRef>
+          <a:fontRef idx="minor">
+            <a:schemeClr val="lt1"/>
+          </a:fontRef>
+        </p:style>
+        <p:txBody>
+          <a:bodyPr rtlCol="0" anchor="ctr"/>
+          <a:lstStyle/>
+          <a:p>
+            <a:pPr algn="ctr"/>
+            <a:endParaRPr lang="en-US"/>
+          </a:p>
+        </p:txBody>
+      </p:sp>
+      <p:sp>
+        <p:nvSpPr>
           <p:cNvPr id="44" name="TextBox 43">
             <a:extLst>
               <a:ext uri="{FF2B5EF4-FFF2-40B4-BE49-F238E27FC236}">
@@ -14175,88 +14324,6 @@
           </a:p>
         </p:txBody>
       </p:sp>
-      <p:cxnSp>
-        <p:nvCxnSpPr>
-          <p:cNvPr id="6" name="Straight Connector 5">
-            <a:extLst>
-              <a:ext uri="{FF2B5EF4-FFF2-40B4-BE49-F238E27FC236}">
-                <a16:creationId xmlns:a16="http://schemas.microsoft.com/office/drawing/2014/main" id="{2381AE1F-38FF-E546-ABDC-317E8B367E6B}"/>
-              </a:ext>
-            </a:extLst>
-          </p:cNvPr>
-          <p:cNvCxnSpPr/>
-          <p:nvPr/>
-        </p:nvCxnSpPr>
-        <p:spPr>
-          <a:xfrm>
-            <a:off x="0" y="1899138"/>
-            <a:ext cx="11774658" cy="0"/>
-          </a:xfrm>
-          <a:prstGeom prst="line">
-            <a:avLst/>
-          </a:prstGeom>
-          <a:ln w="22225">
-            <a:solidFill>
-              <a:schemeClr val="tx1"/>
-            </a:solidFill>
-          </a:ln>
-        </p:spPr>
-        <p:style>
-          <a:lnRef idx="1">
-            <a:schemeClr val="accent1"/>
-          </a:lnRef>
-          <a:fillRef idx="0">
-            <a:schemeClr val="accent1"/>
-          </a:fillRef>
-          <a:effectRef idx="0">
-            <a:schemeClr val="accent1"/>
-          </a:effectRef>
-          <a:fontRef idx="minor">
-            <a:schemeClr val="tx1"/>
-          </a:fontRef>
-        </p:style>
-      </p:cxnSp>
-      <p:cxnSp>
-        <p:nvCxnSpPr>
-          <p:cNvPr id="23" name="Straight Connector 22">
-            <a:extLst>
-              <a:ext uri="{FF2B5EF4-FFF2-40B4-BE49-F238E27FC236}">
-                <a16:creationId xmlns:a16="http://schemas.microsoft.com/office/drawing/2014/main" id="{E797A4AB-B19E-9246-AD02-A65C8FBAB9E5}"/>
-              </a:ext>
-            </a:extLst>
-          </p:cNvPr>
-          <p:cNvCxnSpPr/>
-          <p:nvPr/>
-        </p:nvCxnSpPr>
-        <p:spPr>
-          <a:xfrm>
-            <a:off x="0" y="4611858"/>
-            <a:ext cx="11774658" cy="0"/>
-          </a:xfrm>
-          <a:prstGeom prst="line">
-            <a:avLst/>
-          </a:prstGeom>
-          <a:ln w="22225">
-            <a:solidFill>
-              <a:schemeClr val="tx1"/>
-            </a:solidFill>
-          </a:ln>
-        </p:spPr>
-        <p:style>
-          <a:lnRef idx="1">
-            <a:schemeClr val="accent1"/>
-          </a:lnRef>
-          <a:fillRef idx="0">
-            <a:schemeClr val="accent1"/>
-          </a:fillRef>
-          <a:effectRef idx="0">
-            <a:schemeClr val="accent1"/>
-          </a:effectRef>
-          <a:fontRef idx="minor">
-            <a:schemeClr val="tx1"/>
-          </a:fontRef>
-        </p:style>
-      </p:cxnSp>
       <p:sp>
         <p:nvSpPr>
           <p:cNvPr id="9" name="TextBox 8">

</xml_diff>

<commit_message>
partial Burgers vectors, .msh meshes, fixed DDaux bug in txt reading
</commit_message>
<xml_diff>
--- a/doxygen/dox/Figures.pptx
+++ b/doxygen/dox/Figures.pptx
@@ -18,6 +18,7 @@
     <p:sldId id="265" r:id="rId12"/>
     <p:sldId id="266" r:id="rId13"/>
     <p:sldId id="267" r:id="rId14"/>
+    <p:sldId id="269" r:id="rId15"/>
   </p:sldIdLst>
   <p:sldSz cx="12192000" cy="6858000"/>
   <p:notesSz cx="6858000" cy="9144000"/>
@@ -271,7 +272,7 @@
           <a:p>
             <a:fld id="{D23F2A37-FA4E-404F-8684-2B916B73A0A7}" type="datetimeFigureOut">
               <a:rPr lang="en-US" smtClean="0"/>
-              <a:t>9/10/19</a:t>
+              <a:t>11/13/19</a:t>
             </a:fld>
             <a:endParaRPr lang="en-US"/>
           </a:p>
@@ -469,7 +470,7 @@
           <a:p>
             <a:fld id="{D23F2A37-FA4E-404F-8684-2B916B73A0A7}" type="datetimeFigureOut">
               <a:rPr lang="en-US" smtClean="0"/>
-              <a:t>9/10/19</a:t>
+              <a:t>11/13/19</a:t>
             </a:fld>
             <a:endParaRPr lang="en-US"/>
           </a:p>
@@ -677,7 +678,7 @@
           <a:p>
             <a:fld id="{D23F2A37-FA4E-404F-8684-2B916B73A0A7}" type="datetimeFigureOut">
               <a:rPr lang="en-US" smtClean="0"/>
-              <a:t>9/10/19</a:t>
+              <a:t>11/13/19</a:t>
             </a:fld>
             <a:endParaRPr lang="en-US"/>
           </a:p>
@@ -875,7 +876,7 @@
           <a:p>
             <a:fld id="{D23F2A37-FA4E-404F-8684-2B916B73A0A7}" type="datetimeFigureOut">
               <a:rPr lang="en-US" smtClean="0"/>
-              <a:t>9/10/19</a:t>
+              <a:t>11/13/19</a:t>
             </a:fld>
             <a:endParaRPr lang="en-US"/>
           </a:p>
@@ -1150,7 +1151,7 @@
           <a:p>
             <a:fld id="{D23F2A37-FA4E-404F-8684-2B916B73A0A7}" type="datetimeFigureOut">
               <a:rPr lang="en-US" smtClean="0"/>
-              <a:t>9/10/19</a:t>
+              <a:t>11/13/19</a:t>
             </a:fld>
             <a:endParaRPr lang="en-US"/>
           </a:p>
@@ -1415,7 +1416,7 @@
           <a:p>
             <a:fld id="{D23F2A37-FA4E-404F-8684-2B916B73A0A7}" type="datetimeFigureOut">
               <a:rPr lang="en-US" smtClean="0"/>
-              <a:t>9/10/19</a:t>
+              <a:t>11/13/19</a:t>
             </a:fld>
             <a:endParaRPr lang="en-US"/>
           </a:p>
@@ -1827,7 +1828,7 @@
           <a:p>
             <a:fld id="{D23F2A37-FA4E-404F-8684-2B916B73A0A7}" type="datetimeFigureOut">
               <a:rPr lang="en-US" smtClean="0"/>
-              <a:t>9/10/19</a:t>
+              <a:t>11/13/19</a:t>
             </a:fld>
             <a:endParaRPr lang="en-US"/>
           </a:p>
@@ -1968,7 +1969,7 @@
           <a:p>
             <a:fld id="{D23F2A37-FA4E-404F-8684-2B916B73A0A7}" type="datetimeFigureOut">
               <a:rPr lang="en-US" smtClean="0"/>
-              <a:t>9/10/19</a:t>
+              <a:t>11/13/19</a:t>
             </a:fld>
             <a:endParaRPr lang="en-US"/>
           </a:p>
@@ -2081,7 +2082,7 @@
           <a:p>
             <a:fld id="{D23F2A37-FA4E-404F-8684-2B916B73A0A7}" type="datetimeFigureOut">
               <a:rPr lang="en-US" smtClean="0"/>
-              <a:t>9/10/19</a:t>
+              <a:t>11/13/19</a:t>
             </a:fld>
             <a:endParaRPr lang="en-US"/>
           </a:p>
@@ -2392,7 +2393,7 @@
           <a:p>
             <a:fld id="{D23F2A37-FA4E-404F-8684-2B916B73A0A7}" type="datetimeFigureOut">
               <a:rPr lang="en-US" smtClean="0"/>
-              <a:t>9/10/19</a:t>
+              <a:t>11/13/19</a:t>
             </a:fld>
             <a:endParaRPr lang="en-US"/>
           </a:p>
@@ -2680,7 +2681,7 @@
           <a:p>
             <a:fld id="{D23F2A37-FA4E-404F-8684-2B916B73A0A7}" type="datetimeFigureOut">
               <a:rPr lang="en-US" smtClean="0"/>
-              <a:t>9/10/19</a:t>
+              <a:t>11/13/19</a:t>
             </a:fld>
             <a:endParaRPr lang="en-US"/>
           </a:p>
@@ -2921,7 +2922,7 @@
           <a:p>
             <a:fld id="{D23F2A37-FA4E-404F-8684-2B916B73A0A7}" type="datetimeFigureOut">
               <a:rPr lang="en-US" smtClean="0"/>
-              <a:t>9/10/19</a:t>
+              <a:t>11/13/19</a:t>
             </a:fld>
             <a:endParaRPr lang="en-US"/>
           </a:p>
@@ -6667,6 +6668,737 @@
 </p:sld>
 </file>
 
+<file path=ppt/slides/slide14.xml><?xml version="1.0" encoding="utf-8"?>
+<p:sld xmlns:a="http://schemas.openxmlformats.org/drawingml/2006/main" xmlns:r="http://schemas.openxmlformats.org/officeDocument/2006/relationships" xmlns:p="http://schemas.openxmlformats.org/presentationml/2006/main">
+  <p:cSld>
+    <p:spTree>
+      <p:nvGrpSpPr>
+        <p:cNvPr id="1" name=""/>
+        <p:cNvGrpSpPr/>
+        <p:nvPr/>
+      </p:nvGrpSpPr>
+      <p:grpSpPr>
+        <a:xfrm>
+          <a:off x="0" y="0"/>
+          <a:ext cx="0" cy="0"/>
+          <a:chOff x="0" y="0"/>
+          <a:chExt cx="0" cy="0"/>
+        </a:xfrm>
+      </p:grpSpPr>
+      <p:sp>
+        <p:nvSpPr>
+          <p:cNvPr id="2" name="TextBox 1">
+            <a:extLst>
+              <a:ext uri="{FF2B5EF4-FFF2-40B4-BE49-F238E27FC236}">
+                <a16:creationId xmlns:a16="http://schemas.microsoft.com/office/drawing/2014/main" id="{B3892EF9-C7EC-2A49-B7A7-31E3E0EFA269}"/>
+              </a:ext>
+            </a:extLst>
+          </p:cNvPr>
+          <p:cNvSpPr txBox="1"/>
+          <p:nvPr/>
+        </p:nvSpPr>
+        <p:spPr>
+          <a:xfrm>
+            <a:off x="4976949" y="1175657"/>
+            <a:ext cx="2403565" cy="313509"/>
+          </a:xfrm>
+          <a:prstGeom prst="rect">
+            <a:avLst/>
+          </a:prstGeom>
+          <a:solidFill>
+            <a:schemeClr val="accent1">
+              <a:lumMod val="40000"/>
+              <a:lumOff val="60000"/>
+            </a:schemeClr>
+          </a:solidFill>
+          <a:ln>
+            <a:solidFill>
+              <a:schemeClr val="accent1"/>
+            </a:solidFill>
+          </a:ln>
+        </p:spPr>
+        <p:txBody>
+          <a:bodyPr wrap="square" rtlCol="0">
+            <a:spAutoFit/>
+          </a:bodyPr>
+          <a:lstStyle/>
+          <a:p>
+            <a:r>
+              <a:rPr lang="en-US" sz="1400" dirty="0" err="1"/>
+              <a:t>TrialExpressionBase</a:t>
+            </a:r>
+            <a:r>
+              <a:rPr lang="en-US" sz="1400" dirty="0"/>
+              <a:t>&lt;Derived&gt;</a:t>
+            </a:r>
+          </a:p>
+        </p:txBody>
+      </p:sp>
+      <p:cxnSp>
+        <p:nvCxnSpPr>
+          <p:cNvPr id="4" name="Straight Arrow Connector 3">
+            <a:extLst>
+              <a:ext uri="{FF2B5EF4-FFF2-40B4-BE49-F238E27FC236}">
+                <a16:creationId xmlns:a16="http://schemas.microsoft.com/office/drawing/2014/main" id="{DE736D7A-FE24-1145-9E63-C4BFF129B3A8}"/>
+              </a:ext>
+            </a:extLst>
+          </p:cNvPr>
+          <p:cNvCxnSpPr>
+            <a:stCxn id="2" idx="3"/>
+          </p:cNvCxnSpPr>
+          <p:nvPr/>
+        </p:nvCxnSpPr>
+        <p:spPr>
+          <a:xfrm flipV="1">
+            <a:off x="7380514" y="1314450"/>
+            <a:ext cx="1363436" cy="17962"/>
+          </a:xfrm>
+          <a:prstGeom prst="straightConnector1">
+            <a:avLst/>
+          </a:prstGeom>
+          <a:ln>
+            <a:headEnd w="lg" len="lg"/>
+            <a:tailEnd type="triangle" w="lg" len="lg"/>
+          </a:ln>
+        </p:spPr>
+        <p:style>
+          <a:lnRef idx="1">
+            <a:schemeClr val="accent1"/>
+          </a:lnRef>
+          <a:fillRef idx="0">
+            <a:schemeClr val="accent1"/>
+          </a:fillRef>
+          <a:effectRef idx="0">
+            <a:schemeClr val="accent1"/>
+          </a:effectRef>
+          <a:fontRef idx="minor">
+            <a:schemeClr val="tx1"/>
+          </a:fontRef>
+        </p:style>
+      </p:cxnSp>
+      <p:sp>
+        <p:nvSpPr>
+          <p:cNvPr id="8" name="TextBox 7">
+            <a:extLst>
+              <a:ext uri="{FF2B5EF4-FFF2-40B4-BE49-F238E27FC236}">
+                <a16:creationId xmlns:a16="http://schemas.microsoft.com/office/drawing/2014/main" id="{39495BF0-F907-7B41-9C44-CE5AE9DD9DA4}"/>
+              </a:ext>
+            </a:extLst>
+          </p:cNvPr>
+          <p:cNvSpPr txBox="1"/>
+          <p:nvPr/>
+        </p:nvSpPr>
+        <p:spPr>
+          <a:xfrm>
+            <a:off x="7671707" y="954099"/>
+            <a:ext cx="781050" cy="369332"/>
+          </a:xfrm>
+          <a:prstGeom prst="rect">
+            <a:avLst/>
+          </a:prstGeom>
+          <a:noFill/>
+        </p:spPr>
+        <p:txBody>
+          <a:bodyPr wrap="square" rtlCol="0">
+            <a:spAutoFit/>
+          </a:bodyPr>
+          <a:lstStyle/>
+          <a:p>
+            <a:r>
+              <a:rPr lang="en-US" dirty="0"/>
+              <a:t>.eval()</a:t>
+            </a:r>
+          </a:p>
+        </p:txBody>
+      </p:sp>
+      <p:sp>
+        <p:nvSpPr>
+          <p:cNvPr id="16" name="TextBox 15">
+            <a:extLst>
+              <a:ext uri="{FF2B5EF4-FFF2-40B4-BE49-F238E27FC236}">
+                <a16:creationId xmlns:a16="http://schemas.microsoft.com/office/drawing/2014/main" id="{AD040D48-1CE3-5A4C-B029-7DD907C1F809}"/>
+              </a:ext>
+            </a:extLst>
+          </p:cNvPr>
+          <p:cNvSpPr txBox="1"/>
+          <p:nvPr/>
+        </p:nvSpPr>
+        <p:spPr>
+          <a:xfrm>
+            <a:off x="8743951" y="1184367"/>
+            <a:ext cx="2057400" cy="304800"/>
+          </a:xfrm>
+          <a:prstGeom prst="rect">
+            <a:avLst/>
+          </a:prstGeom>
+          <a:solidFill>
+            <a:schemeClr val="accent1">
+              <a:lumMod val="40000"/>
+              <a:lumOff val="60000"/>
+            </a:schemeClr>
+          </a:solidFill>
+          <a:ln>
+            <a:solidFill>
+              <a:schemeClr val="accent1"/>
+            </a:solidFill>
+          </a:ln>
+        </p:spPr>
+        <p:txBody>
+          <a:bodyPr wrap="square" rtlCol="0">
+            <a:spAutoFit/>
+          </a:bodyPr>
+          <a:lstStyle/>
+          <a:p>
+            <a:r>
+              <a:rPr lang="en-US" sz="1400" dirty="0" err="1"/>
+              <a:t>EvalExpression</a:t>
+            </a:r>
+            <a:r>
+              <a:rPr lang="en-US" sz="1400" dirty="0"/>
+              <a:t>&lt;Derived&gt;</a:t>
+            </a:r>
+          </a:p>
+        </p:txBody>
+      </p:sp>
+      <p:cxnSp>
+        <p:nvCxnSpPr>
+          <p:cNvPr id="17" name="Straight Arrow Connector 16">
+            <a:extLst>
+              <a:ext uri="{FF2B5EF4-FFF2-40B4-BE49-F238E27FC236}">
+                <a16:creationId xmlns:a16="http://schemas.microsoft.com/office/drawing/2014/main" id="{3B3345E0-70C6-FD4C-BE08-4669393DCBB6}"/>
+              </a:ext>
+            </a:extLst>
+          </p:cNvPr>
+          <p:cNvCxnSpPr/>
+          <p:nvPr/>
+        </p:nvCxnSpPr>
+        <p:spPr>
+          <a:xfrm flipV="1">
+            <a:off x="3613512" y="1332411"/>
+            <a:ext cx="1363436" cy="17962"/>
+          </a:xfrm>
+          <a:prstGeom prst="straightConnector1">
+            <a:avLst/>
+          </a:prstGeom>
+          <a:ln>
+            <a:headEnd type="triangle" w="lg" len="lg"/>
+            <a:tailEnd type="none"/>
+          </a:ln>
+        </p:spPr>
+        <p:style>
+          <a:lnRef idx="1">
+            <a:schemeClr val="accent1"/>
+          </a:lnRef>
+          <a:fillRef idx="0">
+            <a:schemeClr val="accent1"/>
+          </a:fillRef>
+          <a:effectRef idx="0">
+            <a:schemeClr val="accent1"/>
+          </a:effectRef>
+          <a:fontRef idx="minor">
+            <a:schemeClr val="tx1"/>
+          </a:fontRef>
+        </p:style>
+      </p:cxnSp>
+      <p:sp>
+        <p:nvSpPr>
+          <p:cNvPr id="18" name="TextBox 17">
+            <a:extLst>
+              <a:ext uri="{FF2B5EF4-FFF2-40B4-BE49-F238E27FC236}">
+                <a16:creationId xmlns:a16="http://schemas.microsoft.com/office/drawing/2014/main" id="{38241533-A0AC-894E-9B5F-98820A25B2AA}"/>
+              </a:ext>
+            </a:extLst>
+          </p:cNvPr>
+          <p:cNvSpPr txBox="1"/>
+          <p:nvPr/>
+        </p:nvSpPr>
+        <p:spPr>
+          <a:xfrm>
+            <a:off x="3950970" y="990991"/>
+            <a:ext cx="781050" cy="369332"/>
+          </a:xfrm>
+          <a:prstGeom prst="rect">
+            <a:avLst/>
+          </a:prstGeom>
+          <a:noFill/>
+        </p:spPr>
+        <p:txBody>
+          <a:bodyPr wrap="square" rtlCol="0">
+            <a:spAutoFit/>
+          </a:bodyPr>
+          <a:lstStyle/>
+          <a:p>
+            <a:r>
+              <a:rPr lang="en-US" dirty="0"/>
+              <a:t>.test()</a:t>
+            </a:r>
+          </a:p>
+        </p:txBody>
+      </p:sp>
+      <p:sp>
+        <p:nvSpPr>
+          <p:cNvPr id="19" name="TextBox 18">
+            <a:extLst>
+              <a:ext uri="{FF2B5EF4-FFF2-40B4-BE49-F238E27FC236}">
+                <a16:creationId xmlns:a16="http://schemas.microsoft.com/office/drawing/2014/main" id="{CBDE63CE-E392-2F40-A428-BF88F67EEC30}"/>
+              </a:ext>
+            </a:extLst>
+          </p:cNvPr>
+          <p:cNvSpPr txBox="1"/>
+          <p:nvPr/>
+        </p:nvSpPr>
+        <p:spPr>
+          <a:xfrm>
+            <a:off x="1556111" y="1184367"/>
+            <a:ext cx="2057400" cy="304800"/>
+          </a:xfrm>
+          <a:prstGeom prst="rect">
+            <a:avLst/>
+          </a:prstGeom>
+          <a:solidFill>
+            <a:schemeClr val="accent1">
+              <a:lumMod val="40000"/>
+              <a:lumOff val="60000"/>
+            </a:schemeClr>
+          </a:solidFill>
+          <a:ln>
+            <a:solidFill>
+              <a:schemeClr val="accent1"/>
+            </a:solidFill>
+          </a:ln>
+        </p:spPr>
+        <p:txBody>
+          <a:bodyPr wrap="square" rtlCol="0">
+            <a:spAutoFit/>
+          </a:bodyPr>
+          <a:lstStyle/>
+          <a:p>
+            <a:r>
+              <a:rPr lang="en-US" sz="1400" dirty="0" err="1"/>
+              <a:t>TestExpression</a:t>
+            </a:r>
+            <a:r>
+              <a:rPr lang="en-US" sz="1400" dirty="0"/>
+              <a:t>&lt;Derived&gt;</a:t>
+            </a:r>
+          </a:p>
+        </p:txBody>
+      </p:sp>
+      <p:sp>
+        <p:nvSpPr>
+          <p:cNvPr id="11" name="TextBox 10">
+            <a:extLst>
+              <a:ext uri="{FF2B5EF4-FFF2-40B4-BE49-F238E27FC236}">
+                <a16:creationId xmlns:a16="http://schemas.microsoft.com/office/drawing/2014/main" id="{E2FEFF57-97EF-0C46-887F-FCEB6DE615C6}"/>
+              </a:ext>
+            </a:extLst>
+          </p:cNvPr>
+          <p:cNvSpPr txBox="1"/>
+          <p:nvPr/>
+        </p:nvSpPr>
+        <p:spPr>
+          <a:xfrm>
+            <a:off x="4295230" y="2362200"/>
+            <a:ext cx="2048420" cy="369332"/>
+          </a:xfrm>
+          <a:prstGeom prst="rect">
+            <a:avLst/>
+          </a:prstGeom>
+          <a:solidFill>
+            <a:schemeClr val="accent6">
+              <a:lumMod val="60000"/>
+              <a:lumOff val="40000"/>
+            </a:schemeClr>
+          </a:solidFill>
+        </p:spPr>
+        <p:txBody>
+          <a:bodyPr wrap="square" rtlCol="0">
+            <a:spAutoFit/>
+          </a:bodyPr>
+          <a:lstStyle/>
+          <a:p>
+            <a:r>
+              <a:rPr lang="en-US" dirty="0"/>
+              <a:t>(</a:t>
+            </a:r>
+            <a:r>
+              <a:rPr lang="en-US" dirty="0" err="1"/>
+              <a:t>testExpr,trialExpr</a:t>
+            </a:r>
+            <a:r>
+              <a:rPr lang="en-US" dirty="0"/>
+              <a:t>)</a:t>
+            </a:r>
+          </a:p>
+        </p:txBody>
+      </p:sp>
+      <p:cxnSp>
+        <p:nvCxnSpPr>
+          <p:cNvPr id="21" name="Straight Arrow Connector 20">
+            <a:extLst>
+              <a:ext uri="{FF2B5EF4-FFF2-40B4-BE49-F238E27FC236}">
+                <a16:creationId xmlns:a16="http://schemas.microsoft.com/office/drawing/2014/main" id="{2485ADAD-218A-484A-86D7-C7C35A6A1172}"/>
+              </a:ext>
+            </a:extLst>
+          </p:cNvPr>
+          <p:cNvCxnSpPr/>
+          <p:nvPr/>
+        </p:nvCxnSpPr>
+        <p:spPr>
+          <a:xfrm flipV="1">
+            <a:off x="6343650" y="2534618"/>
+            <a:ext cx="1363436" cy="17962"/>
+          </a:xfrm>
+          <a:prstGeom prst="straightConnector1">
+            <a:avLst/>
+          </a:prstGeom>
+          <a:ln>
+            <a:solidFill>
+              <a:schemeClr val="accent6">
+                <a:lumMod val="75000"/>
+              </a:schemeClr>
+            </a:solidFill>
+            <a:headEnd w="lg" len="lg"/>
+            <a:tailEnd type="triangle" w="lg" len="lg"/>
+          </a:ln>
+        </p:spPr>
+        <p:style>
+          <a:lnRef idx="1">
+            <a:schemeClr val="accent1"/>
+          </a:lnRef>
+          <a:fillRef idx="0">
+            <a:schemeClr val="accent1"/>
+          </a:fillRef>
+          <a:effectRef idx="0">
+            <a:schemeClr val="accent1"/>
+          </a:effectRef>
+          <a:fontRef idx="minor">
+            <a:schemeClr val="tx1"/>
+          </a:fontRef>
+        </p:style>
+      </p:cxnSp>
+      <p:sp>
+        <p:nvSpPr>
+          <p:cNvPr id="22" name="TextBox 21">
+            <a:extLst>
+              <a:ext uri="{FF2B5EF4-FFF2-40B4-BE49-F238E27FC236}">
+                <a16:creationId xmlns:a16="http://schemas.microsoft.com/office/drawing/2014/main" id="{A9119176-4893-054C-A2C2-66D45DC8F0EC}"/>
+              </a:ext>
+            </a:extLst>
+          </p:cNvPr>
+          <p:cNvSpPr txBox="1"/>
+          <p:nvPr/>
+        </p:nvSpPr>
+        <p:spPr>
+          <a:xfrm>
+            <a:off x="7781381" y="2367914"/>
+            <a:ext cx="2048420" cy="369332"/>
+          </a:xfrm>
+          <a:prstGeom prst="rect">
+            <a:avLst/>
+          </a:prstGeom>
+          <a:solidFill>
+            <a:schemeClr val="accent6">
+              <a:lumMod val="60000"/>
+              <a:lumOff val="40000"/>
+            </a:schemeClr>
+          </a:solidFill>
+        </p:spPr>
+        <p:txBody>
+          <a:bodyPr wrap="square" rtlCol="0">
+            <a:spAutoFit/>
+          </a:bodyPr>
+          <a:lstStyle/>
+          <a:p>
+            <a:r>
+              <a:rPr lang="en-US" dirty="0" err="1"/>
+              <a:t>BilinearForm</a:t>
+            </a:r>
+            <a:endParaRPr lang="en-US" dirty="0"/>
+          </a:p>
+        </p:txBody>
+      </p:sp>
+      <p:sp>
+        <p:nvSpPr>
+          <p:cNvPr id="26" name="TextBox 25">
+            <a:extLst>
+              <a:ext uri="{FF2B5EF4-FFF2-40B4-BE49-F238E27FC236}">
+                <a16:creationId xmlns:a16="http://schemas.microsoft.com/office/drawing/2014/main" id="{149A1121-686E-D84C-A13B-5B98DD17DFF7}"/>
+              </a:ext>
+            </a:extLst>
+          </p:cNvPr>
+          <p:cNvSpPr txBox="1"/>
+          <p:nvPr/>
+        </p:nvSpPr>
+        <p:spPr>
+          <a:xfrm>
+            <a:off x="4295230" y="2903950"/>
+            <a:ext cx="2048420" cy="369332"/>
+          </a:xfrm>
+          <a:prstGeom prst="rect">
+            <a:avLst/>
+          </a:prstGeom>
+          <a:solidFill>
+            <a:schemeClr val="accent6">
+              <a:lumMod val="60000"/>
+              <a:lumOff val="40000"/>
+            </a:schemeClr>
+          </a:solidFill>
+        </p:spPr>
+        <p:txBody>
+          <a:bodyPr wrap="square" rtlCol="0">
+            <a:spAutoFit/>
+          </a:bodyPr>
+          <a:lstStyle/>
+          <a:p>
+            <a:r>
+              <a:rPr lang="en-US" dirty="0"/>
+              <a:t>(</a:t>
+            </a:r>
+            <a:r>
+              <a:rPr lang="en-US" dirty="0" err="1"/>
+              <a:t>testExpr,evalExpr</a:t>
+            </a:r>
+            <a:r>
+              <a:rPr lang="en-US" dirty="0"/>
+              <a:t>)</a:t>
+            </a:r>
+          </a:p>
+        </p:txBody>
+      </p:sp>
+      <p:cxnSp>
+        <p:nvCxnSpPr>
+          <p:cNvPr id="27" name="Straight Arrow Connector 26">
+            <a:extLst>
+              <a:ext uri="{FF2B5EF4-FFF2-40B4-BE49-F238E27FC236}">
+                <a16:creationId xmlns:a16="http://schemas.microsoft.com/office/drawing/2014/main" id="{6C3633F6-E3A1-C040-B70B-6D1E4D41D9E4}"/>
+              </a:ext>
+            </a:extLst>
+          </p:cNvPr>
+          <p:cNvCxnSpPr/>
+          <p:nvPr/>
+        </p:nvCxnSpPr>
+        <p:spPr>
+          <a:xfrm flipV="1">
+            <a:off x="6343650" y="3076368"/>
+            <a:ext cx="1363436" cy="17962"/>
+          </a:xfrm>
+          <a:prstGeom prst="straightConnector1">
+            <a:avLst/>
+          </a:prstGeom>
+          <a:ln>
+            <a:solidFill>
+              <a:schemeClr val="accent6">
+                <a:lumMod val="75000"/>
+              </a:schemeClr>
+            </a:solidFill>
+            <a:headEnd w="lg" len="lg"/>
+            <a:tailEnd type="triangle" w="lg" len="lg"/>
+          </a:ln>
+        </p:spPr>
+        <p:style>
+          <a:lnRef idx="1">
+            <a:schemeClr val="accent1"/>
+          </a:lnRef>
+          <a:fillRef idx="0">
+            <a:schemeClr val="accent1"/>
+          </a:fillRef>
+          <a:effectRef idx="0">
+            <a:schemeClr val="accent1"/>
+          </a:effectRef>
+          <a:fontRef idx="minor">
+            <a:schemeClr val="tx1"/>
+          </a:fontRef>
+        </p:style>
+      </p:cxnSp>
+      <p:sp>
+        <p:nvSpPr>
+          <p:cNvPr id="28" name="TextBox 27">
+            <a:extLst>
+              <a:ext uri="{FF2B5EF4-FFF2-40B4-BE49-F238E27FC236}">
+                <a16:creationId xmlns:a16="http://schemas.microsoft.com/office/drawing/2014/main" id="{4FC38688-4ED5-834E-81FE-EBBE248D90D8}"/>
+              </a:ext>
+            </a:extLst>
+          </p:cNvPr>
+          <p:cNvSpPr txBox="1"/>
+          <p:nvPr/>
+        </p:nvSpPr>
+        <p:spPr>
+          <a:xfrm>
+            <a:off x="7781381" y="2909664"/>
+            <a:ext cx="2048420" cy="369332"/>
+          </a:xfrm>
+          <a:prstGeom prst="rect">
+            <a:avLst/>
+          </a:prstGeom>
+          <a:solidFill>
+            <a:schemeClr val="accent6">
+              <a:lumMod val="60000"/>
+              <a:lumOff val="40000"/>
+            </a:schemeClr>
+          </a:solidFill>
+        </p:spPr>
+        <p:txBody>
+          <a:bodyPr wrap="square" rtlCol="0">
+            <a:spAutoFit/>
+          </a:bodyPr>
+          <a:lstStyle/>
+          <a:p>
+            <a:r>
+              <a:rPr lang="en-US" dirty="0" err="1"/>
+              <a:t>LinearForm</a:t>
+            </a:r>
+            <a:endParaRPr lang="en-US" dirty="0"/>
+          </a:p>
+        </p:txBody>
+      </p:sp>
+      <p:sp>
+        <p:nvSpPr>
+          <p:cNvPr id="29" name="TextBox 28">
+            <a:extLst>
+              <a:ext uri="{FF2B5EF4-FFF2-40B4-BE49-F238E27FC236}">
+                <a16:creationId xmlns:a16="http://schemas.microsoft.com/office/drawing/2014/main" id="{2426B4F1-CFD4-F049-8FED-CE4E3C4E0D91}"/>
+              </a:ext>
+            </a:extLst>
+          </p:cNvPr>
+          <p:cNvSpPr txBox="1"/>
+          <p:nvPr/>
+        </p:nvSpPr>
+        <p:spPr>
+          <a:xfrm>
+            <a:off x="4295230" y="3455940"/>
+            <a:ext cx="2048420" cy="369332"/>
+          </a:xfrm>
+          <a:prstGeom prst="rect">
+            <a:avLst/>
+          </a:prstGeom>
+          <a:solidFill>
+            <a:schemeClr val="accent6">
+              <a:lumMod val="60000"/>
+              <a:lumOff val="40000"/>
+            </a:schemeClr>
+          </a:solidFill>
+        </p:spPr>
+        <p:txBody>
+          <a:bodyPr wrap="square" rtlCol="0">
+            <a:spAutoFit/>
+          </a:bodyPr>
+          <a:lstStyle/>
+          <a:p>
+            <a:r>
+              <a:rPr lang="en-US" dirty="0"/>
+              <a:t>(</a:t>
+            </a:r>
+            <a:r>
+              <a:rPr lang="en-US" dirty="0" err="1"/>
+              <a:t>evalExpr,trialExpr</a:t>
+            </a:r>
+            <a:r>
+              <a:rPr lang="en-US" dirty="0"/>
+              <a:t>)</a:t>
+            </a:r>
+          </a:p>
+        </p:txBody>
+      </p:sp>
+      <p:cxnSp>
+        <p:nvCxnSpPr>
+          <p:cNvPr id="30" name="Straight Arrow Connector 29">
+            <a:extLst>
+              <a:ext uri="{FF2B5EF4-FFF2-40B4-BE49-F238E27FC236}">
+                <a16:creationId xmlns:a16="http://schemas.microsoft.com/office/drawing/2014/main" id="{57EBB8F1-914C-4842-82DD-CE2608DC28D4}"/>
+              </a:ext>
+            </a:extLst>
+          </p:cNvPr>
+          <p:cNvCxnSpPr/>
+          <p:nvPr/>
+        </p:nvCxnSpPr>
+        <p:spPr>
+          <a:xfrm flipV="1">
+            <a:off x="6343650" y="3628358"/>
+            <a:ext cx="1363436" cy="17962"/>
+          </a:xfrm>
+          <a:prstGeom prst="straightConnector1">
+            <a:avLst/>
+          </a:prstGeom>
+          <a:ln>
+            <a:solidFill>
+              <a:schemeClr val="accent6">
+                <a:lumMod val="75000"/>
+              </a:schemeClr>
+            </a:solidFill>
+            <a:headEnd w="lg" len="lg"/>
+            <a:tailEnd type="triangle" w="lg" len="lg"/>
+          </a:ln>
+        </p:spPr>
+        <p:style>
+          <a:lnRef idx="1">
+            <a:schemeClr val="accent1"/>
+          </a:lnRef>
+          <a:fillRef idx="0">
+            <a:schemeClr val="accent1"/>
+          </a:fillRef>
+          <a:effectRef idx="0">
+            <a:schemeClr val="accent1"/>
+          </a:effectRef>
+          <a:fontRef idx="minor">
+            <a:schemeClr val="tx1"/>
+          </a:fontRef>
+        </p:style>
+      </p:cxnSp>
+      <p:sp>
+        <p:nvSpPr>
+          <p:cNvPr id="33" name="TextBox 32">
+            <a:extLst>
+              <a:ext uri="{FF2B5EF4-FFF2-40B4-BE49-F238E27FC236}">
+                <a16:creationId xmlns:a16="http://schemas.microsoft.com/office/drawing/2014/main" id="{15C34FD5-A0C3-A944-974B-EE12F4697675}"/>
+              </a:ext>
+            </a:extLst>
+          </p:cNvPr>
+          <p:cNvSpPr txBox="1"/>
+          <p:nvPr/>
+        </p:nvSpPr>
+        <p:spPr>
+          <a:xfrm>
+            <a:off x="7781381" y="3461654"/>
+            <a:ext cx="2048420" cy="369332"/>
+          </a:xfrm>
+          <a:prstGeom prst="rect">
+            <a:avLst/>
+          </a:prstGeom>
+          <a:solidFill>
+            <a:schemeClr val="accent6">
+              <a:lumMod val="60000"/>
+              <a:lumOff val="40000"/>
+            </a:schemeClr>
+          </a:solidFill>
+        </p:spPr>
+        <p:txBody>
+          <a:bodyPr wrap="square" rtlCol="0">
+            <a:spAutoFit/>
+          </a:bodyPr>
+          <a:lstStyle/>
+          <a:p>
+            <a:r>
+              <a:rPr lang="en-US" dirty="0" err="1"/>
+              <a:t>LinearConstraint</a:t>
+            </a:r>
+            <a:endParaRPr lang="en-US" dirty="0"/>
+          </a:p>
+        </p:txBody>
+      </p:sp>
+    </p:spTree>
+    <p:extLst>
+      <p:ext uri="{BB962C8B-B14F-4D97-AF65-F5344CB8AC3E}">
+        <p14:creationId xmlns:p14="http://schemas.microsoft.com/office/powerpoint/2010/main" val="2539264858"/>
+      </p:ext>
+    </p:extLst>
+  </p:cSld>
+  <p:clrMapOvr>
+    <a:masterClrMapping/>
+  </p:clrMapOvr>
+</p:sld>
+</file>
+
 <file path=ppt/slides/slide2.xml><?xml version="1.0" encoding="utf-8"?>
 <p:sld xmlns:a="http://schemas.openxmlformats.org/drawingml/2006/main" xmlns:r="http://schemas.openxmlformats.org/officeDocument/2006/relationships" xmlns:p="http://schemas.openxmlformats.org/presentationml/2006/main">
   <p:cSld>

</xml_diff>